<commit_message>
Actualizacion Doxygen y Diapositivas
</commit_message>
<xml_diff>
--- a/Diapositivas/Presentación.pptx
+++ b/Diapositivas/Presentación.pptx
@@ -20,8 +20,7 @@
     <p:sldId id="272" r:id="rId14"/>
     <p:sldId id="266" r:id="rId15"/>
     <p:sldId id="262" r:id="rId16"/>
-    <p:sldId id="263" r:id="rId17"/>
-    <p:sldId id="264" r:id="rId18"/>
+    <p:sldId id="264" r:id="rId17"/>
   </p:sldIdLst>
   <p:sldSz cx="12192000" cy="6858000"/>
   <p:notesSz cx="6858000" cy="9144000"/>
@@ -317,7 +316,7 @@
             <a:fld id="{B61BEF0D-F0BB-DE4B-95CE-6DB70DBA9567}" type="datetimeFigureOut">
               <a:rPr lang="en-US" dirty="0"/>
               <a:pPr/>
-              <a:t>7/7/2013</a:t>
+              <a:t>7/8/2013</a:t>
             </a:fld>
             <a:endParaRPr lang="en-US" dirty="0"/>
           </a:p>
@@ -652,7 +651,7 @@
             <a:fld id="{B61BEF0D-F0BB-DE4B-95CE-6DB70DBA9567}" type="datetimeFigureOut">
               <a:rPr lang="en-US" dirty="0"/>
               <a:pPr/>
-              <a:t>7/7/2013</a:t>
+              <a:t>7/8/2013</a:t>
             </a:fld>
             <a:endParaRPr lang="en-US" dirty="0"/>
           </a:p>
@@ -1050,7 +1049,7 @@
             <a:fld id="{B61BEF0D-F0BB-DE4B-95CE-6DB70DBA9567}" type="datetimeFigureOut">
               <a:rPr lang="en-US" dirty="0"/>
               <a:pPr/>
-              <a:t>7/7/2013</a:t>
+              <a:t>7/8/2013</a:t>
             </a:fld>
             <a:endParaRPr lang="en-US" dirty="0"/>
           </a:p>
@@ -1383,7 +1382,7 @@
             <a:fld id="{B61BEF0D-F0BB-DE4B-95CE-6DB70DBA9567}" type="datetimeFigureOut">
               <a:rPr lang="en-US" dirty="0"/>
               <a:pPr/>
-              <a:t>7/7/2013</a:t>
+              <a:t>7/8/2013</a:t>
             </a:fld>
             <a:endParaRPr lang="en-US" dirty="0"/>
           </a:p>
@@ -1700,7 +1699,7 @@
             <a:fld id="{B61BEF0D-F0BB-DE4B-95CE-6DB70DBA9567}" type="datetimeFigureOut">
               <a:rPr lang="en-US" dirty="0"/>
               <a:pPr/>
-              <a:t>7/7/2013</a:t>
+              <a:t>7/8/2013</a:t>
             </a:fld>
             <a:endParaRPr lang="en-US" dirty="0"/>
           </a:p>
@@ -2093,7 +2092,7 @@
             <a:fld id="{B61BEF0D-F0BB-DE4B-95CE-6DB70DBA9567}" type="datetimeFigureOut">
               <a:rPr lang="en-US" dirty="0"/>
               <a:pPr/>
-              <a:t>7/7/2013</a:t>
+              <a:t>7/8/2013</a:t>
             </a:fld>
             <a:endParaRPr lang="en-US" dirty="0"/>
           </a:p>
@@ -2347,7 +2346,7 @@
             <a:fld id="{B61BEF0D-F0BB-DE4B-95CE-6DB70DBA9567}" type="datetimeFigureOut">
               <a:rPr lang="en-US" dirty="0"/>
               <a:pPr/>
-              <a:t>7/7/2013</a:t>
+              <a:t>7/8/2013</a:t>
             </a:fld>
             <a:endParaRPr lang="en-US" dirty="0"/>
           </a:p>
@@ -2606,7 +2605,7 @@
             <a:fld id="{B61BEF0D-F0BB-DE4B-95CE-6DB70DBA9567}" type="datetimeFigureOut">
               <a:rPr lang="en-US" dirty="0"/>
               <a:pPr/>
-              <a:t>7/7/2013</a:t>
+              <a:t>7/8/2013</a:t>
             </a:fld>
             <a:endParaRPr lang="en-US" dirty="0"/>
           </a:p>
@@ -2865,7 +2864,7 @@
             <a:fld id="{B61BEF0D-F0BB-DE4B-95CE-6DB70DBA9567}" type="datetimeFigureOut">
               <a:rPr lang="en-US" dirty="0"/>
               <a:pPr/>
-              <a:t>7/7/2013</a:t>
+              <a:t>7/8/2013</a:t>
             </a:fld>
             <a:endParaRPr lang="en-US" dirty="0"/>
           </a:p>
@@ -3191,7 +3190,7 @@
             <a:fld id="{B61BEF0D-F0BB-DE4B-95CE-6DB70DBA9567}" type="datetimeFigureOut">
               <a:rPr lang="en-US" dirty="0"/>
               <a:pPr/>
-              <a:t>7/7/2013</a:t>
+              <a:t>7/8/2013</a:t>
             </a:fld>
             <a:endParaRPr lang="en-US" dirty="0"/>
           </a:p>
@@ -3511,7 +3510,7 @@
             <a:fld id="{B61BEF0D-F0BB-DE4B-95CE-6DB70DBA9567}" type="datetimeFigureOut">
               <a:rPr lang="en-US" dirty="0"/>
               <a:pPr/>
-              <a:t>7/7/2013</a:t>
+              <a:t>7/8/2013</a:t>
             </a:fld>
             <a:endParaRPr lang="en-US" dirty="0"/>
           </a:p>
@@ -3965,7 +3964,7 @@
             <a:fld id="{B61BEF0D-F0BB-DE4B-95CE-6DB70DBA9567}" type="datetimeFigureOut">
               <a:rPr lang="en-US" dirty="0"/>
               <a:pPr/>
-              <a:t>7/7/2013</a:t>
+              <a:t>7/8/2013</a:t>
             </a:fld>
             <a:endParaRPr lang="en-US" dirty="0"/>
           </a:p>
@@ -4167,7 +4166,7 @@
             <a:fld id="{B61BEF0D-F0BB-DE4B-95CE-6DB70DBA9567}" type="datetimeFigureOut">
               <a:rPr lang="en-US" dirty="0"/>
               <a:pPr/>
-              <a:t>7/7/2013</a:t>
+              <a:t>7/8/2013</a:t>
             </a:fld>
             <a:endParaRPr lang="en-US" dirty="0"/>
           </a:p>
@@ -4341,7 +4340,7 @@
             <a:fld id="{B61BEF0D-F0BB-DE4B-95CE-6DB70DBA9567}" type="datetimeFigureOut">
               <a:rPr lang="en-US" dirty="0"/>
               <a:pPr/>
-              <a:t>7/7/2013</a:t>
+              <a:t>7/8/2013</a:t>
             </a:fld>
             <a:endParaRPr lang="en-US" dirty="0"/>
           </a:p>
@@ -4671,7 +4670,7 @@
             <a:fld id="{B61BEF0D-F0BB-DE4B-95CE-6DB70DBA9567}" type="datetimeFigureOut">
               <a:rPr lang="en-US" dirty="0"/>
               <a:pPr/>
-              <a:t>7/7/2013</a:t>
+              <a:t>7/8/2013</a:t>
             </a:fld>
             <a:endParaRPr lang="en-US" dirty="0"/>
           </a:p>
@@ -5013,7 +5012,7 @@
             <a:fld id="{B61BEF0D-F0BB-DE4B-95CE-6DB70DBA9567}" type="datetimeFigureOut">
               <a:rPr lang="en-US" dirty="0"/>
               <a:pPr/>
-              <a:t>7/7/2013</a:t>
+              <a:t>7/8/2013</a:t>
             </a:fld>
             <a:endParaRPr lang="en-US" dirty="0"/>
           </a:p>
@@ -7127,7 +7126,7 @@
             <a:fld id="{B61BEF0D-F0BB-DE4B-95CE-6DB70DBA9567}" type="datetimeFigureOut">
               <a:rPr lang="en-US" dirty="0"/>
               <a:pPr/>
-              <a:t>7/7/2013</a:t>
+              <a:t>7/8/2013</a:t>
             </a:fld>
             <a:endParaRPr lang="en-US" dirty="0"/>
           </a:p>
@@ -8073,28 +8072,22 @@
       </p:pic>
       <p:pic>
         <p:nvPicPr>
-          <p:cNvPr id="6" name="Imagen 5"/>
+          <p:cNvPr id="3" name="Imagen 2"/>
           <p:cNvPicPr>
             <a:picLocks noChangeAspect="1"/>
           </p:cNvPicPr>
           <p:nvPr/>
         </p:nvPicPr>
         <p:blipFill>
-          <a:blip r:embed="rId4">
-            <a:extLst>
-              <a:ext uri="{28A0092B-C50C-407E-A947-70E740481C1C}">
-                <a14:useLocalDpi xmlns:a14="http://schemas.microsoft.com/office/drawing/2010/main" val="0"/>
-              </a:ext>
-            </a:extLst>
-          </a:blip>
+          <a:blip r:embed="rId4"/>
           <a:stretch>
             <a:fillRect/>
           </a:stretch>
         </p:blipFill>
         <p:spPr>
           <a:xfrm>
-            <a:off x="4595989" y="1507862"/>
-            <a:ext cx="6630325" cy="5125165"/>
+            <a:off x="4428210" y="1558658"/>
+            <a:ext cx="6514286" cy="5028571"/>
           </a:xfrm>
           <a:prstGeom prst="rect">
             <a:avLst/>
@@ -8391,7 +8384,9 @@
               <a:buNone/>
             </a:pPr>
             <a:r>
-              <a:rPr lang="es-EC" sz="3300" b="1" u="sng" dirty="0" smtClean="0"/>
+              <a:rPr lang="es-EC" sz="3300" b="1" u="sng" dirty="0" smtClean="0">
+                <a:hlinkClick r:id="rId2" action="ppaction://hlinkfile"/>
+              </a:rPr>
               <a:t>VER</a:t>
             </a:r>
             <a:endParaRPr lang="es-EC" sz="3300" b="1" u="sng" dirty="0"/>
@@ -8407,7 +8402,7 @@
           <p:nvPr/>
         </p:nvPicPr>
         <p:blipFill>
-          <a:blip r:embed="rId2"/>
+          <a:blip r:embed="rId3"/>
           <a:stretch>
             <a:fillRect/>
           </a:stretch>
@@ -8476,6 +8471,30 @@
           </a:p>
         </p:txBody>
       </p:sp>
+      <p:pic>
+        <p:nvPicPr>
+          <p:cNvPr id="3" name="Imagen 2"/>
+          <p:cNvPicPr>
+            <a:picLocks noChangeAspect="1"/>
+          </p:cNvPicPr>
+          <p:nvPr/>
+        </p:nvPicPr>
+        <p:blipFill>
+          <a:blip r:embed="rId2"/>
+          <a:stretch>
+            <a:fillRect/>
+          </a:stretch>
+        </p:blipFill>
+        <p:spPr>
+          <a:xfrm>
+            <a:off x="2927786" y="1250907"/>
+            <a:ext cx="8304323" cy="5354456"/>
+          </a:xfrm>
+          <a:prstGeom prst="rect">
+            <a:avLst/>
+          </a:prstGeom>
+        </p:spPr>
+      </p:pic>
     </p:spTree>
     <p:extLst>
       <p:ext uri="{BB962C8B-B14F-4D97-AF65-F5344CB8AC3E}">
@@ -8523,51 +8542,21 @@
           <a:p>
             <a:pPr algn="ctr"/>
             <a:r>
-              <a:rPr lang="es-EC" b="1" dirty="0"/>
-              <a:t>GITHUB</a:t>
-            </a:r>
-            <a:endParaRPr lang="es-EC" dirty="0"/>
-          </a:p>
-        </p:txBody>
-      </p:sp>
-    </p:spTree>
-    <p:extLst>
-      <p:ext uri="{BB962C8B-B14F-4D97-AF65-F5344CB8AC3E}">
-        <p14:creationId xmlns:p14="http://schemas.microsoft.com/office/powerpoint/2010/main" val="1354394911"/>
-      </p:ext>
-    </p:extLst>
-  </p:cSld>
-  <p:clrMapOvr>
-    <a:masterClrMapping/>
-  </p:clrMapOvr>
-</p:sld>
-</file>
-
-<file path=ppt/slides/slide17.xml><?xml version="1.0" encoding="utf-8"?>
-<p:sld xmlns:a="http://schemas.openxmlformats.org/drawingml/2006/main" xmlns:r="http://schemas.openxmlformats.org/officeDocument/2006/relationships" xmlns:p="http://schemas.openxmlformats.org/presentationml/2006/main">
-  <p:cSld>
-    <p:spTree>
-      <p:nvGrpSpPr>
-        <p:cNvPr id="1" name=""/>
-        <p:cNvGrpSpPr/>
-        <p:nvPr/>
-      </p:nvGrpSpPr>
-      <p:grpSpPr>
-        <a:xfrm>
-          <a:off x="0" y="0"/>
-          <a:ext cx="0" cy="0"/>
-          <a:chOff x="0" y="0"/>
-          <a:chExt cx="0" cy="0"/>
-        </a:xfrm>
-      </p:grpSpPr>
-      <p:sp>
-        <p:nvSpPr>
-          <p:cNvPr id="2" name="Título 1"/>
-          <p:cNvSpPr>
-            <a:spLocks noGrp="1"/>
-          </p:cNvSpPr>
-          <p:nvPr>
-            <p:ph type="title"/>
+              <a:rPr lang="es-EC" b="1" dirty="0" smtClean="0"/>
+              <a:t>CALIFICACION</a:t>
+            </a:r>
+            <a:endParaRPr lang="es-EC" b="1" dirty="0"/>
+          </a:p>
+        </p:txBody>
+      </p:sp>
+      <p:sp>
+        <p:nvSpPr>
+          <p:cNvPr id="3" name="Marcador de contenido 2"/>
+          <p:cNvSpPr>
+            <a:spLocks noGrp="1"/>
+          </p:cNvSpPr>
+          <p:nvPr>
+            <p:ph idx="1"/>
           </p:nvPr>
         </p:nvSpPr>
         <p:spPr/>
@@ -8575,30 +8564,6 @@
           <a:bodyPr/>
           <a:lstStyle/>
           <a:p>
-            <a:pPr algn="ctr"/>
-            <a:r>
-              <a:rPr lang="es-EC" b="1" dirty="0" smtClean="0"/>
-              <a:t>CALIFICACION</a:t>
-            </a:r>
-            <a:endParaRPr lang="es-EC" b="1" dirty="0"/>
-          </a:p>
-        </p:txBody>
-      </p:sp>
-      <p:sp>
-        <p:nvSpPr>
-          <p:cNvPr id="3" name="Marcador de contenido 2"/>
-          <p:cNvSpPr>
-            <a:spLocks noGrp="1"/>
-          </p:cNvSpPr>
-          <p:nvPr>
-            <p:ph idx="1"/>
-          </p:nvPr>
-        </p:nvSpPr>
-        <p:spPr/>
-        <p:txBody>
-          <a:bodyPr/>
-          <a:lstStyle/>
-          <a:p>
             <a:r>
               <a:rPr lang="es-EC" dirty="0" smtClean="0"/>
               <a:t>INTERFAZ: </a:t>
@@ -8612,17 +8577,12 @@
           <a:p>
             <a:r>
               <a:rPr lang="es-EC" dirty="0" smtClean="0"/>
-              <a:t>FUNCIONALIDAD</a:t>
-            </a:r>
-            <a:r>
-              <a:rPr lang="es-EC" dirty="0" smtClean="0"/>
-              <a:t>: </a:t>
+              <a:t>FUNCIONALIDAD: </a:t>
             </a:r>
             <a:r>
               <a:rPr lang="es-EC" b="1" dirty="0" smtClean="0"/>
               <a:t>15/15</a:t>
             </a:r>
-            <a:endParaRPr lang="es-EC" b="1" dirty="0" smtClean="0"/>
           </a:p>
           <a:p>
             <a:r>
@@ -8633,7 +8593,6 @@
               <a:rPr lang="es-EC" b="1" dirty="0" smtClean="0"/>
               <a:t>5/5</a:t>
             </a:r>
-            <a:endParaRPr lang="es-EC" b="1" dirty="0" smtClean="0"/>
           </a:p>
           <a:p>
             <a:r>
@@ -8649,17 +8608,12 @@
           <a:p>
             <a:r>
               <a:rPr lang="es-EC" dirty="0" smtClean="0"/>
-              <a:t>GITHUB</a:t>
-            </a:r>
-            <a:r>
-              <a:rPr lang="es-EC" dirty="0" smtClean="0"/>
-              <a:t>: </a:t>
+              <a:t>GITHUB: </a:t>
             </a:r>
             <a:r>
               <a:rPr lang="es-EC" b="1" dirty="0" smtClean="0"/>
               <a:t>10/10</a:t>
             </a:r>
-            <a:endParaRPr lang="es-EC" b="1" dirty="0" smtClean="0"/>
           </a:p>
           <a:p>
             <a:pPr marL="0" indent="0">
@@ -8667,15 +8621,7 @@
             </a:pPr>
             <a:r>
               <a:rPr lang="es-EC" b="1" dirty="0" smtClean="0"/>
-              <a:t>      TOTAL</a:t>
-            </a:r>
-            <a:r>
-              <a:rPr lang="es-EC" b="1" dirty="0" smtClean="0"/>
-              <a:t>: </a:t>
-            </a:r>
-            <a:r>
-              <a:rPr lang="es-EC" b="1" dirty="0" smtClean="0"/>
-              <a:t>40</a:t>
+              <a:t>      TOTAL: 40</a:t>
             </a:r>
             <a:endParaRPr lang="es-EC" b="1" dirty="0"/>
           </a:p>
@@ -8824,11 +8770,7 @@
             <a:pPr algn="ctr"/>
             <a:r>
               <a:rPr lang="es-EC" b="1" dirty="0" smtClean="0"/>
-              <a:t>EMPEZANDO EL </a:t>
-            </a:r>
-            <a:r>
-              <a:rPr lang="es-EC" b="1" dirty="0" smtClean="0"/>
-              <a:t>JUEGO</a:t>
+              <a:t>EMPEZANDO EL JUEGO</a:t>
             </a:r>
             <a:endParaRPr lang="es-EC" b="1" dirty="0"/>
           </a:p>
@@ -8836,7 +8778,7 @@
       </p:sp>
       <p:pic>
         <p:nvPicPr>
-          <p:cNvPr id="6" name="Imagen 5"/>
+          <p:cNvPr id="4" name="Imagen 3"/>
           <p:cNvPicPr>
             <a:picLocks noChangeAspect="1"/>
           </p:cNvPicPr>
@@ -8850,8 +8792,8 @@
         </p:blipFill>
         <p:spPr>
           <a:xfrm>
-            <a:off x="4428212" y="1388024"/>
-            <a:ext cx="6053270" cy="4679108"/>
+            <a:off x="1126258" y="2670786"/>
+            <a:ext cx="1466667" cy="2580952"/>
           </a:xfrm>
           <a:prstGeom prst="rect">
             <a:avLst/>
@@ -8860,7 +8802,7 @@
       </p:pic>
       <p:pic>
         <p:nvPicPr>
-          <p:cNvPr id="4" name="Imagen 3"/>
+          <p:cNvPr id="7" name="Imagen 6"/>
           <p:cNvPicPr>
             <a:picLocks noChangeAspect="1"/>
           </p:cNvPicPr>
@@ -8874,8 +8816,8 @@
         </p:blipFill>
         <p:spPr>
           <a:xfrm>
-            <a:off x="1126258" y="2670786"/>
-            <a:ext cx="1466667" cy="2580952"/>
+            <a:off x="2877392" y="2989428"/>
+            <a:ext cx="1266351" cy="1392072"/>
           </a:xfrm>
           <a:prstGeom prst="rect">
             <a:avLst/>
@@ -8884,7 +8826,7 @@
       </p:pic>
       <p:pic>
         <p:nvPicPr>
-          <p:cNvPr id="7" name="Imagen 6"/>
+          <p:cNvPr id="3" name="Imagen 2"/>
           <p:cNvPicPr>
             <a:picLocks noChangeAspect="1"/>
           </p:cNvPicPr>
@@ -8898,8 +8840,8 @@
         </p:blipFill>
         <p:spPr>
           <a:xfrm>
-            <a:off x="2877392" y="2989428"/>
-            <a:ext cx="1266351" cy="1392072"/>
+            <a:off x="4428210" y="1442214"/>
+            <a:ext cx="6485714" cy="5038095"/>
           </a:xfrm>
           <a:prstGeom prst="rect">
             <a:avLst/>
@@ -8969,7 +8911,7 @@
       </p:sp>
       <p:pic>
         <p:nvPicPr>
-          <p:cNvPr id="6" name="Imagen 5"/>
+          <p:cNvPr id="3" name="Imagen 2"/>
           <p:cNvPicPr>
             <a:picLocks noChangeAspect="1"/>
           </p:cNvPicPr>
@@ -8983,8 +8925,8 @@
         </p:blipFill>
         <p:spPr>
           <a:xfrm>
-            <a:off x="3518280" y="1387385"/>
-            <a:ext cx="6629400" cy="5124450"/>
+            <a:off x="3394055" y="1429869"/>
+            <a:ext cx="6485714" cy="5028571"/>
           </a:xfrm>
           <a:prstGeom prst="rect">
             <a:avLst/>
@@ -9483,28 +9425,46 @@
       </p:sp>
       <p:pic>
         <p:nvPicPr>
-          <p:cNvPr id="5" name="Imagen 4"/>
+          <p:cNvPr id="3" name="Imagen 2"/>
           <p:cNvPicPr>
             <a:picLocks noChangeAspect="1"/>
           </p:cNvPicPr>
           <p:nvPr/>
         </p:nvPicPr>
         <p:blipFill>
-          <a:blip r:embed="rId2">
-            <a:extLst>
-              <a:ext uri="{28A0092B-C50C-407E-A947-70E740481C1C}">
-                <a14:useLocalDpi xmlns:a14="http://schemas.microsoft.com/office/drawing/2010/main" val="0"/>
-              </a:ext>
-            </a:extLst>
-          </a:blip>
+          <a:blip r:embed="rId2"/>
           <a:stretch>
             <a:fillRect/>
           </a:stretch>
         </p:blipFill>
         <p:spPr>
           <a:xfrm>
-            <a:off x="3559637" y="1372063"/>
-            <a:ext cx="6628571" cy="5123809"/>
+            <a:off x="4566467" y="1367586"/>
+            <a:ext cx="4964602" cy="3849207"/>
+          </a:xfrm>
+          <a:prstGeom prst="rect">
+            <a:avLst/>
+          </a:prstGeom>
+        </p:spPr>
+      </p:pic>
+      <p:pic>
+        <p:nvPicPr>
+          <p:cNvPr id="6" name="Imagen 5"/>
+          <p:cNvPicPr>
+            <a:picLocks noChangeAspect="1"/>
+          </p:cNvPicPr>
+          <p:nvPr/>
+        </p:nvPicPr>
+        <p:blipFill>
+          <a:blip r:embed="rId3"/>
+          <a:stretch>
+            <a:fillRect/>
+          </a:stretch>
+        </p:blipFill>
+        <p:spPr>
+          <a:xfrm>
+            <a:off x="553792" y="5305329"/>
+            <a:ext cx="11436439" cy="1309880"/>
           </a:xfrm>
           <a:prstGeom prst="rect">
             <a:avLst/>

</xml_diff>

<commit_message>
modificaciones en ppt manual de qtsudoku
</commit_message>
<xml_diff>
--- a/Diapositivas/Presentación.pptx
+++ b/Diapositivas/Presentación.pptx
@@ -121,7 +121,7 @@
   </p:defaultTextStyle>
   <p:extLst>
     <p:ext uri="{EFAFB233-063F-42B5-8137-9DF3F51BA10A}">
-      <p15:sldGuideLst xmlns:p15="http://schemas.microsoft.com/office/powerpoint/2012/main"/>
+      <p15:sldGuideLst xmlns:p15="http://schemas.microsoft.com/office/powerpoint/2012/main" xmlns=""/>
     </p:ext>
   </p:extLst>
 </p:presentation>
@@ -316,7 +316,7 @@
             <a:fld id="{B61BEF0D-F0BB-DE4B-95CE-6DB70DBA9567}" type="datetimeFigureOut">
               <a:rPr lang="en-US" dirty="0"/>
               <a:pPr/>
-              <a:t>7/8/2013</a:t>
+              <a:t>9/15/2013</a:t>
             </a:fld>
             <a:endParaRPr lang="en-US" dirty="0"/>
           </a:p>
@@ -651,7 +651,7 @@
             <a:fld id="{B61BEF0D-F0BB-DE4B-95CE-6DB70DBA9567}" type="datetimeFigureOut">
               <a:rPr lang="en-US" dirty="0"/>
               <a:pPr/>
-              <a:t>7/8/2013</a:t>
+              <a:t>9/15/2013</a:t>
             </a:fld>
             <a:endParaRPr lang="en-US" dirty="0"/>
           </a:p>
@@ -1049,7 +1049,7 @@
             <a:fld id="{B61BEF0D-F0BB-DE4B-95CE-6DB70DBA9567}" type="datetimeFigureOut">
               <a:rPr lang="en-US" dirty="0"/>
               <a:pPr/>
-              <a:t>7/8/2013</a:t>
+              <a:t>9/15/2013</a:t>
             </a:fld>
             <a:endParaRPr lang="en-US" dirty="0"/>
           </a:p>
@@ -1382,7 +1382,7 @@
             <a:fld id="{B61BEF0D-F0BB-DE4B-95CE-6DB70DBA9567}" type="datetimeFigureOut">
               <a:rPr lang="en-US" dirty="0"/>
               <a:pPr/>
-              <a:t>7/8/2013</a:t>
+              <a:t>9/15/2013</a:t>
             </a:fld>
             <a:endParaRPr lang="en-US" dirty="0"/>
           </a:p>
@@ -1699,7 +1699,7 @@
             <a:fld id="{B61BEF0D-F0BB-DE4B-95CE-6DB70DBA9567}" type="datetimeFigureOut">
               <a:rPr lang="en-US" dirty="0"/>
               <a:pPr/>
-              <a:t>7/8/2013</a:t>
+              <a:t>9/15/2013</a:t>
             </a:fld>
             <a:endParaRPr lang="en-US" dirty="0"/>
           </a:p>
@@ -2092,7 +2092,7 @@
             <a:fld id="{B61BEF0D-F0BB-DE4B-95CE-6DB70DBA9567}" type="datetimeFigureOut">
               <a:rPr lang="en-US" dirty="0"/>
               <a:pPr/>
-              <a:t>7/8/2013</a:t>
+              <a:t>9/15/2013</a:t>
             </a:fld>
             <a:endParaRPr lang="en-US" dirty="0"/>
           </a:p>
@@ -2346,7 +2346,7 @@
             <a:fld id="{B61BEF0D-F0BB-DE4B-95CE-6DB70DBA9567}" type="datetimeFigureOut">
               <a:rPr lang="en-US" dirty="0"/>
               <a:pPr/>
-              <a:t>7/8/2013</a:t>
+              <a:t>9/15/2013</a:t>
             </a:fld>
             <a:endParaRPr lang="en-US" dirty="0"/>
           </a:p>
@@ -2605,7 +2605,7 @@
             <a:fld id="{B61BEF0D-F0BB-DE4B-95CE-6DB70DBA9567}" type="datetimeFigureOut">
               <a:rPr lang="en-US" dirty="0"/>
               <a:pPr/>
-              <a:t>7/8/2013</a:t>
+              <a:t>9/15/2013</a:t>
             </a:fld>
             <a:endParaRPr lang="en-US" dirty="0"/>
           </a:p>
@@ -2864,7 +2864,7 @@
             <a:fld id="{B61BEF0D-F0BB-DE4B-95CE-6DB70DBA9567}" type="datetimeFigureOut">
               <a:rPr lang="en-US" dirty="0"/>
               <a:pPr/>
-              <a:t>7/8/2013</a:t>
+              <a:t>9/15/2013</a:t>
             </a:fld>
             <a:endParaRPr lang="en-US" dirty="0"/>
           </a:p>
@@ -3190,7 +3190,7 @@
             <a:fld id="{B61BEF0D-F0BB-DE4B-95CE-6DB70DBA9567}" type="datetimeFigureOut">
               <a:rPr lang="en-US" dirty="0"/>
               <a:pPr/>
-              <a:t>7/8/2013</a:t>
+              <a:t>9/15/2013</a:t>
             </a:fld>
             <a:endParaRPr lang="en-US" dirty="0"/>
           </a:p>
@@ -3510,7 +3510,7 @@
             <a:fld id="{B61BEF0D-F0BB-DE4B-95CE-6DB70DBA9567}" type="datetimeFigureOut">
               <a:rPr lang="en-US" dirty="0"/>
               <a:pPr/>
-              <a:t>7/8/2013</a:t>
+              <a:t>9/15/2013</a:t>
             </a:fld>
             <a:endParaRPr lang="en-US" dirty="0"/>
           </a:p>
@@ -3964,7 +3964,7 @@
             <a:fld id="{B61BEF0D-F0BB-DE4B-95CE-6DB70DBA9567}" type="datetimeFigureOut">
               <a:rPr lang="en-US" dirty="0"/>
               <a:pPr/>
-              <a:t>7/8/2013</a:t>
+              <a:t>9/15/2013</a:t>
             </a:fld>
             <a:endParaRPr lang="en-US" dirty="0"/>
           </a:p>
@@ -4166,7 +4166,7 @@
             <a:fld id="{B61BEF0D-F0BB-DE4B-95CE-6DB70DBA9567}" type="datetimeFigureOut">
               <a:rPr lang="en-US" dirty="0"/>
               <a:pPr/>
-              <a:t>7/8/2013</a:t>
+              <a:t>9/15/2013</a:t>
             </a:fld>
             <a:endParaRPr lang="en-US" dirty="0"/>
           </a:p>
@@ -4340,7 +4340,7 @@
             <a:fld id="{B61BEF0D-F0BB-DE4B-95CE-6DB70DBA9567}" type="datetimeFigureOut">
               <a:rPr lang="en-US" dirty="0"/>
               <a:pPr/>
-              <a:t>7/8/2013</a:t>
+              <a:t>9/15/2013</a:t>
             </a:fld>
             <a:endParaRPr lang="en-US" dirty="0"/>
           </a:p>
@@ -4670,7 +4670,7 @@
             <a:fld id="{B61BEF0D-F0BB-DE4B-95CE-6DB70DBA9567}" type="datetimeFigureOut">
               <a:rPr lang="en-US" dirty="0"/>
               <a:pPr/>
-              <a:t>7/8/2013</a:t>
+              <a:t>9/15/2013</a:t>
             </a:fld>
             <a:endParaRPr lang="en-US" dirty="0"/>
           </a:p>
@@ -5012,7 +5012,7 @@
             <a:fld id="{B61BEF0D-F0BB-DE4B-95CE-6DB70DBA9567}" type="datetimeFigureOut">
               <a:rPr lang="en-US" dirty="0"/>
               <a:pPr/>
-              <a:t>7/8/2013</a:t>
+              <a:t>9/15/2013</a:t>
             </a:fld>
             <a:endParaRPr lang="en-US" dirty="0"/>
           </a:p>
@@ -7126,7 +7126,7 @@
             <a:fld id="{B61BEF0D-F0BB-DE4B-95CE-6DB70DBA9567}" type="datetimeFigureOut">
               <a:rPr lang="en-US" dirty="0"/>
               <a:pPr/>
-              <a:t>7/8/2013</a:t>
+              <a:t>9/15/2013</a:t>
             </a:fld>
             <a:endParaRPr lang="en-US" dirty="0"/>
           </a:p>
@@ -7740,7 +7740,7 @@
     </p:spTree>
     <p:extLst>
       <p:ext uri="{BB962C8B-B14F-4D97-AF65-F5344CB8AC3E}">
-        <p14:creationId xmlns:p14="http://schemas.microsoft.com/office/powerpoint/2010/main" val="1737629708"/>
+        <p14:creationId xmlns:p14="http://schemas.microsoft.com/office/powerpoint/2010/main" xmlns="" val="1737629708"/>
       </p:ext>
     </p:extLst>
   </p:cSld>
@@ -7873,7 +7873,7 @@
     </p:spTree>
     <p:extLst>
       <p:ext uri="{BB962C8B-B14F-4D97-AF65-F5344CB8AC3E}">
-        <p14:creationId xmlns:p14="http://schemas.microsoft.com/office/powerpoint/2010/main" val="3288503771"/>
+        <p14:creationId xmlns:p14="http://schemas.microsoft.com/office/powerpoint/2010/main" xmlns="" val="3288503771"/>
       </p:ext>
     </p:extLst>
   </p:cSld>
@@ -7943,7 +7943,7 @@
           <a:blip r:embed="rId2">
             <a:extLst>
               <a:ext uri="{28A0092B-C50C-407E-A947-70E740481C1C}">
-                <a14:useLocalDpi xmlns:a14="http://schemas.microsoft.com/office/drawing/2010/main" val="0"/>
+                <a14:useLocalDpi xmlns:a14="http://schemas.microsoft.com/office/drawing/2010/main" xmlns="" val="0"/>
               </a:ext>
             </a:extLst>
           </a:blip>
@@ -7964,7 +7964,7 @@
     </p:spTree>
     <p:extLst>
       <p:ext uri="{BB962C8B-B14F-4D97-AF65-F5344CB8AC3E}">
-        <p14:creationId xmlns:p14="http://schemas.microsoft.com/office/powerpoint/2010/main" val="1885352089"/>
+        <p14:creationId xmlns:p14="http://schemas.microsoft.com/office/powerpoint/2010/main" xmlns="" val="1885352089"/>
       </p:ext>
     </p:extLst>
   </p:cSld>
@@ -8097,7 +8097,7 @@
     </p:spTree>
     <p:extLst>
       <p:ext uri="{BB962C8B-B14F-4D97-AF65-F5344CB8AC3E}">
-        <p14:creationId xmlns:p14="http://schemas.microsoft.com/office/powerpoint/2010/main" val="811030607"/>
+        <p14:creationId xmlns:p14="http://schemas.microsoft.com/office/powerpoint/2010/main" xmlns="" val="811030607"/>
       </p:ext>
     </p:extLst>
   </p:cSld>
@@ -8295,7 +8295,7 @@
     </p:spTree>
     <p:extLst>
       <p:ext uri="{BB962C8B-B14F-4D97-AF65-F5344CB8AC3E}">
-        <p14:creationId xmlns:p14="http://schemas.microsoft.com/office/powerpoint/2010/main" val="1565994546"/>
+        <p14:creationId xmlns:p14="http://schemas.microsoft.com/office/powerpoint/2010/main" xmlns="" val="1565994546"/>
       </p:ext>
     </p:extLst>
   </p:cSld>
@@ -8420,7 +8420,7 @@
     </p:spTree>
     <p:extLst>
       <p:ext uri="{BB962C8B-B14F-4D97-AF65-F5344CB8AC3E}">
-        <p14:creationId xmlns:p14="http://schemas.microsoft.com/office/powerpoint/2010/main" val="512347387"/>
+        <p14:creationId xmlns:p14="http://schemas.microsoft.com/office/powerpoint/2010/main" xmlns="" val="512347387"/>
       </p:ext>
     </p:extLst>
   </p:cSld>
@@ -8498,7 +8498,7 @@
     </p:spTree>
     <p:extLst>
       <p:ext uri="{BB962C8B-B14F-4D97-AF65-F5344CB8AC3E}">
-        <p14:creationId xmlns:p14="http://schemas.microsoft.com/office/powerpoint/2010/main" val="1316612466"/>
+        <p14:creationId xmlns:p14="http://schemas.microsoft.com/office/powerpoint/2010/main" xmlns="" val="1316612466"/>
       </p:ext>
     </p:extLst>
   </p:cSld>
@@ -8581,8 +8581,9 @@
             </a:r>
             <a:r>
               <a:rPr lang="es-EC" b="1" dirty="0" smtClean="0"/>
-              <a:t>15/15</a:t>
-            </a:r>
+              <a:t>13/15</a:t>
+            </a:r>
+            <a:endParaRPr lang="es-EC" b="1" dirty="0" smtClean="0"/>
           </a:p>
           <a:p>
             <a:r>
@@ -8630,7 +8631,7 @@
     </p:spTree>
     <p:extLst>
       <p:ext uri="{BB962C8B-B14F-4D97-AF65-F5344CB8AC3E}">
-        <p14:creationId xmlns:p14="http://schemas.microsoft.com/office/powerpoint/2010/main" val="3229332613"/>
+        <p14:creationId xmlns:p14="http://schemas.microsoft.com/office/powerpoint/2010/main" xmlns="" val="3229332613"/>
       </p:ext>
     </p:extLst>
   </p:cSld>
@@ -8695,7 +8696,7 @@
           <a:blip r:embed="rId2">
             <a:extLst>
               <a:ext uri="{28A0092B-C50C-407E-A947-70E740481C1C}">
-                <a14:useLocalDpi xmlns:a14="http://schemas.microsoft.com/office/drawing/2010/main" val="0"/>
+                <a14:useLocalDpi xmlns:a14="http://schemas.microsoft.com/office/drawing/2010/main" xmlns="" val="0"/>
               </a:ext>
             </a:extLst>
           </a:blip>
@@ -8705,7 +8706,7 @@
         </p:blipFill>
         <p:spPr>
           <a:xfrm>
-            <a:off x="3820799" y="1332795"/>
+            <a:off x="3325499" y="1243895"/>
             <a:ext cx="6455938" cy="4963236"/>
           </a:xfrm>
         </p:spPr>
@@ -8713,7 +8714,7 @@
     </p:spTree>
     <p:extLst>
       <p:ext uri="{BB962C8B-B14F-4D97-AF65-F5344CB8AC3E}">
-        <p14:creationId xmlns:p14="http://schemas.microsoft.com/office/powerpoint/2010/main" val="1741206998"/>
+        <p14:creationId xmlns:p14="http://schemas.microsoft.com/office/powerpoint/2010/main" xmlns="" val="1741206998"/>
       </p:ext>
     </p:extLst>
   </p:cSld>
@@ -8792,7 +8793,7 @@
         </p:blipFill>
         <p:spPr>
           <a:xfrm>
-            <a:off x="1126258" y="2670786"/>
+            <a:off x="1685058" y="2607286"/>
             <a:ext cx="1466667" cy="2580952"/>
           </a:xfrm>
           <a:prstGeom prst="rect">
@@ -8816,7 +8817,7 @@
         </p:blipFill>
         <p:spPr>
           <a:xfrm>
-            <a:off x="2877392" y="2989428"/>
+            <a:off x="3118692" y="2798928"/>
             <a:ext cx="1266351" cy="1392072"/>
           </a:xfrm>
           <a:prstGeom prst="rect">
@@ -8851,7 +8852,7 @@
     </p:spTree>
     <p:extLst>
       <p:ext uri="{BB962C8B-B14F-4D97-AF65-F5344CB8AC3E}">
-        <p14:creationId xmlns:p14="http://schemas.microsoft.com/office/powerpoint/2010/main" val="3576493787"/>
+        <p14:creationId xmlns:p14="http://schemas.microsoft.com/office/powerpoint/2010/main" xmlns="" val="3576493787"/>
       </p:ext>
     </p:extLst>
   </p:cSld>
@@ -8895,7 +8896,12 @@
             <p:ph type="title"/>
           </p:nvPr>
         </p:nvSpPr>
-        <p:spPr/>
+        <p:spPr>
+          <a:xfrm>
+            <a:off x="1894425" y="649510"/>
+            <a:ext cx="8911687" cy="1280890"/>
+          </a:xfrm>
+        </p:spPr>
         <p:txBody>
           <a:bodyPr/>
           <a:lstStyle/>
@@ -8925,7 +8931,7 @@
         </p:blipFill>
         <p:spPr>
           <a:xfrm>
-            <a:off x="3394055" y="1429869"/>
+            <a:off x="4029055" y="1493369"/>
             <a:ext cx="6485714" cy="5028571"/>
           </a:xfrm>
           <a:prstGeom prst="rect">
@@ -8933,10 +8939,160 @@
           </a:prstGeom>
         </p:spPr>
       </p:pic>
+      <p:sp>
+        <p:nvSpPr>
+          <p:cNvPr id="4" name="3 CuadroTexto"/>
+          <p:cNvSpPr txBox="1"/>
+          <p:nvPr/>
+        </p:nvSpPr>
+        <p:spPr>
+          <a:xfrm>
+            <a:off x="762000" y="2413000"/>
+            <a:ext cx="3124200" cy="2308324"/>
+          </a:xfrm>
+          <a:prstGeom prst="rect">
+            <a:avLst/>
+          </a:prstGeom>
+          <a:noFill/>
+        </p:spPr>
+        <p:txBody>
+          <a:bodyPr wrap="square" rtlCol="0">
+            <a:spAutoFit/>
+          </a:bodyPr>
+          <a:lstStyle/>
+          <a:p>
+            <a:r>
+              <a:rPr lang="en-US" b="1" dirty="0" smtClean="0"/>
+              <a:t>Al </a:t>
+            </a:r>
+            <a:r>
+              <a:rPr lang="en-US" b="1" dirty="0" err="1" smtClean="0"/>
+              <a:t>iniciar</a:t>
+            </a:r>
+            <a:r>
+              <a:rPr lang="en-US" b="1" dirty="0" smtClean="0"/>
+              <a:t> </a:t>
+            </a:r>
+            <a:r>
+              <a:rPr lang="en-US" b="1" dirty="0" err="1" smtClean="0"/>
+              <a:t>juego</a:t>
+            </a:r>
+            <a:r>
+              <a:rPr lang="en-US" b="1" dirty="0" smtClean="0"/>
+              <a:t> se </a:t>
+            </a:r>
+            <a:r>
+              <a:rPr lang="en-US" b="1" dirty="0" err="1" smtClean="0"/>
+              <a:t>llenan</a:t>
+            </a:r>
+            <a:r>
+              <a:rPr lang="en-US" b="1" dirty="0" smtClean="0"/>
+              <a:t> </a:t>
+            </a:r>
+            <a:r>
+              <a:rPr lang="en-US" b="1" dirty="0" err="1" smtClean="0"/>
+              <a:t>cierto</a:t>
+            </a:r>
+            <a:r>
+              <a:rPr lang="en-US" b="1" dirty="0" smtClean="0"/>
+              <a:t> </a:t>
+            </a:r>
+            <a:r>
+              <a:rPr lang="en-US" b="1" dirty="0" err="1" smtClean="0"/>
+              <a:t>numero</a:t>
+            </a:r>
+            <a:r>
+              <a:rPr lang="en-US" b="1" dirty="0" smtClean="0"/>
+              <a:t> de </a:t>
+            </a:r>
+            <a:r>
+              <a:rPr lang="en-US" b="1" dirty="0" err="1" smtClean="0"/>
+              <a:t>casillas</a:t>
+            </a:r>
+            <a:r>
+              <a:rPr lang="en-US" b="1" dirty="0" smtClean="0"/>
+              <a:t> del </a:t>
+            </a:r>
+            <a:r>
+              <a:rPr lang="en-US" b="1" dirty="0" err="1" smtClean="0"/>
+              <a:t>tablero</a:t>
+            </a:r>
+            <a:r>
+              <a:rPr lang="en-US" b="1" dirty="0" smtClean="0"/>
+              <a:t> </a:t>
+            </a:r>
+            <a:r>
+              <a:rPr lang="en-US" b="1" dirty="0" err="1" smtClean="0"/>
+              <a:t>aleatoriamente</a:t>
+            </a:r>
+            <a:r>
+              <a:rPr lang="en-US" b="1" dirty="0" smtClean="0"/>
+              <a:t> </a:t>
+            </a:r>
+            <a:r>
+              <a:rPr lang="en-US" b="1" dirty="0" err="1" smtClean="0"/>
+              <a:t>dependiendo</a:t>
+            </a:r>
+            <a:r>
+              <a:rPr lang="en-US" b="1" dirty="0" smtClean="0"/>
+              <a:t> de la </a:t>
+            </a:r>
+            <a:r>
+              <a:rPr lang="en-US" b="1" dirty="0" err="1" smtClean="0"/>
+              <a:t>dificultad</a:t>
+            </a:r>
+            <a:r>
+              <a:rPr lang="en-US" b="1" dirty="0" smtClean="0"/>
+              <a:t> </a:t>
+            </a:r>
+            <a:r>
+              <a:rPr lang="en-US" b="1" dirty="0" err="1" smtClean="0"/>
+              <a:t>escogida</a:t>
+            </a:r>
+            <a:r>
+              <a:rPr lang="en-US" b="1" dirty="0" smtClean="0"/>
+              <a:t>, a </a:t>
+            </a:r>
+            <a:r>
+              <a:rPr lang="en-US" b="1" dirty="0" err="1" smtClean="0"/>
+              <a:t>partir</a:t>
+            </a:r>
+            <a:r>
+              <a:rPr lang="en-US" b="1" dirty="0" smtClean="0"/>
+              <a:t> de </a:t>
+            </a:r>
+            <a:r>
+              <a:rPr lang="en-US" b="1" dirty="0" err="1" smtClean="0"/>
+              <a:t>plantillas</a:t>
+            </a:r>
+            <a:r>
+              <a:rPr lang="en-US" b="1" dirty="0" smtClean="0"/>
+              <a:t> </a:t>
+            </a:r>
+            <a:r>
+              <a:rPr lang="en-US" b="1" dirty="0" err="1" smtClean="0"/>
+              <a:t>ya</a:t>
+            </a:r>
+            <a:r>
+              <a:rPr lang="en-US" b="1" dirty="0" smtClean="0"/>
+              <a:t> </a:t>
+            </a:r>
+            <a:r>
+              <a:rPr lang="en-US" b="1" dirty="0" err="1" smtClean="0"/>
+              <a:t>existentes</a:t>
+            </a:r>
+            <a:r>
+              <a:rPr lang="en-US" b="1" dirty="0" smtClean="0"/>
+              <a:t>.</a:t>
+            </a:r>
+            <a:endParaRPr lang="es-EC" b="1" dirty="0"/>
+          </a:p>
+        </p:txBody>
+      </p:sp>
     </p:spTree>
     <p:extLst>
       <p:ext uri="{BB962C8B-B14F-4D97-AF65-F5344CB8AC3E}">
-        <p14:creationId xmlns:p14="http://schemas.microsoft.com/office/powerpoint/2010/main" val="3875228942"/>
+        <p14:creationId xmlns:p14="http://schemas.microsoft.com/office/powerpoint/2010/main" xmlns="" val="3875228942"/>
       </p:ext>
     </p:extLst>
   </p:cSld>
@@ -9011,7 +9167,7 @@
           <a:blip r:embed="rId2">
             <a:extLst>
               <a:ext uri="{28A0092B-C50C-407E-A947-70E740481C1C}">
-                <a14:useLocalDpi xmlns:a14="http://schemas.microsoft.com/office/drawing/2010/main" val="0"/>
+                <a14:useLocalDpi xmlns:a14="http://schemas.microsoft.com/office/drawing/2010/main" xmlns="" val="0"/>
               </a:ext>
             </a:extLst>
           </a:blip>
@@ -9041,7 +9197,7 @@
           <a:blip r:embed="rId3">
             <a:extLst>
               <a:ext uri="{28A0092B-C50C-407E-A947-70E740481C1C}">
-                <a14:useLocalDpi xmlns:a14="http://schemas.microsoft.com/office/drawing/2010/main" val="0"/>
+                <a14:useLocalDpi xmlns:a14="http://schemas.microsoft.com/office/drawing/2010/main" xmlns="" val="0"/>
               </a:ext>
             </a:extLst>
           </a:blip>
@@ -9062,7 +9218,7 @@
     </p:spTree>
     <p:extLst>
       <p:ext uri="{BB962C8B-B14F-4D97-AF65-F5344CB8AC3E}">
-        <p14:creationId xmlns:p14="http://schemas.microsoft.com/office/powerpoint/2010/main" val="972631756"/>
+        <p14:creationId xmlns:p14="http://schemas.microsoft.com/office/powerpoint/2010/main" xmlns="" val="972631756"/>
       </p:ext>
     </p:extLst>
   </p:cSld>
@@ -9132,7 +9288,7 @@
           <a:blip r:embed="rId2">
             <a:extLst>
               <a:ext uri="{28A0092B-C50C-407E-A947-70E740481C1C}">
-                <a14:useLocalDpi xmlns:a14="http://schemas.microsoft.com/office/drawing/2010/main" val="0"/>
+                <a14:useLocalDpi xmlns:a14="http://schemas.microsoft.com/office/drawing/2010/main" xmlns="" val="0"/>
               </a:ext>
             </a:extLst>
           </a:blip>
@@ -9153,7 +9309,7 @@
     </p:spTree>
     <p:extLst>
       <p:ext uri="{BB962C8B-B14F-4D97-AF65-F5344CB8AC3E}">
-        <p14:creationId xmlns:p14="http://schemas.microsoft.com/office/powerpoint/2010/main" val="897857819"/>
+        <p14:creationId xmlns:p14="http://schemas.microsoft.com/office/powerpoint/2010/main" xmlns="" val="897857819"/>
       </p:ext>
     </p:extLst>
   </p:cSld>
@@ -9223,7 +9379,7 @@
           <a:blip r:embed="rId2">
             <a:extLst>
               <a:ext uri="{28A0092B-C50C-407E-A947-70E740481C1C}">
-                <a14:useLocalDpi xmlns:a14="http://schemas.microsoft.com/office/drawing/2010/main" val="0"/>
+                <a14:useLocalDpi xmlns:a14="http://schemas.microsoft.com/office/drawing/2010/main" xmlns="" val="0"/>
               </a:ext>
             </a:extLst>
           </a:blip>
@@ -9253,7 +9409,7 @@
           <a:blip r:embed="rId3">
             <a:extLst>
               <a:ext uri="{28A0092B-C50C-407E-A947-70E740481C1C}">
-                <a14:useLocalDpi xmlns:a14="http://schemas.microsoft.com/office/drawing/2010/main" val="0"/>
+                <a14:useLocalDpi xmlns:a14="http://schemas.microsoft.com/office/drawing/2010/main" xmlns="" val="0"/>
               </a:ext>
             </a:extLst>
           </a:blip>
@@ -9274,7 +9430,7 @@
     </p:spTree>
     <p:extLst>
       <p:ext uri="{BB962C8B-B14F-4D97-AF65-F5344CB8AC3E}">
-        <p14:creationId xmlns:p14="http://schemas.microsoft.com/office/powerpoint/2010/main" val="2601842565"/>
+        <p14:creationId xmlns:p14="http://schemas.microsoft.com/office/powerpoint/2010/main" xmlns="" val="2601842565"/>
       </p:ext>
     </p:extLst>
   </p:cSld>
@@ -9344,7 +9500,7 @@
           <a:blip r:embed="rId2">
             <a:extLst>
               <a:ext uri="{28A0092B-C50C-407E-A947-70E740481C1C}">
-                <a14:useLocalDpi xmlns:a14="http://schemas.microsoft.com/office/drawing/2010/main" val="0"/>
+                <a14:useLocalDpi xmlns:a14="http://schemas.microsoft.com/office/drawing/2010/main" xmlns="" val="0"/>
               </a:ext>
             </a:extLst>
           </a:blip>
@@ -9365,7 +9521,7 @@
     </p:spTree>
     <p:extLst>
       <p:ext uri="{BB962C8B-B14F-4D97-AF65-F5344CB8AC3E}">
-        <p14:creationId xmlns:p14="http://schemas.microsoft.com/office/powerpoint/2010/main" val="1701919126"/>
+        <p14:creationId xmlns:p14="http://schemas.microsoft.com/office/powerpoint/2010/main" xmlns="" val="1701919126"/>
       </p:ext>
     </p:extLst>
   </p:cSld>
@@ -9471,10 +9627,200 @@
           </a:prstGeom>
         </p:spPr>
       </p:pic>
+      <p:sp>
+        <p:nvSpPr>
+          <p:cNvPr id="5" name="4 CuadroTexto"/>
+          <p:cNvSpPr txBox="1"/>
+          <p:nvPr/>
+        </p:nvSpPr>
+        <p:spPr>
+          <a:xfrm>
+            <a:off x="711200" y="1435100"/>
+            <a:ext cx="3670300" cy="2862322"/>
+          </a:xfrm>
+          <a:prstGeom prst="rect">
+            <a:avLst/>
+          </a:prstGeom>
+          <a:noFill/>
+        </p:spPr>
+        <p:txBody>
+          <a:bodyPr wrap="square" rtlCol="0">
+            <a:spAutoFit/>
+          </a:bodyPr>
+          <a:lstStyle/>
+          <a:p>
+            <a:r>
+              <a:rPr lang="en-US" b="1" dirty="0" smtClean="0"/>
+              <a:t>Al momento de </a:t>
+            </a:r>
+            <a:r>
+              <a:rPr lang="en-US" b="1" dirty="0" err="1" smtClean="0"/>
+              <a:t>guardar</a:t>
+            </a:r>
+            <a:r>
+              <a:rPr lang="en-US" b="1" dirty="0" smtClean="0"/>
+              <a:t> los </a:t>
+            </a:r>
+            <a:r>
+              <a:rPr lang="en-US" b="1" dirty="0" err="1" smtClean="0"/>
+              <a:t>valores</a:t>
+            </a:r>
+            <a:r>
+              <a:rPr lang="en-US" b="1" dirty="0" smtClean="0"/>
+              <a:t> </a:t>
+            </a:r>
+            <a:r>
+              <a:rPr lang="en-US" b="1" dirty="0" err="1" smtClean="0"/>
+              <a:t>ingresados</a:t>
+            </a:r>
+            <a:r>
+              <a:rPr lang="en-US" b="1" dirty="0" smtClean="0"/>
+              <a:t> son </a:t>
+            </a:r>
+            <a:r>
+              <a:rPr lang="en-US" b="1" dirty="0" err="1" smtClean="0"/>
+              <a:t>encriptados</a:t>
+            </a:r>
+            <a:r>
+              <a:rPr lang="en-US" b="1" dirty="0" smtClean="0"/>
+              <a:t> con </a:t>
+            </a:r>
+            <a:r>
+              <a:rPr lang="en-US" b="1" dirty="0" err="1" smtClean="0"/>
+              <a:t>desplazamientos</a:t>
+            </a:r>
+            <a:r>
+              <a:rPr lang="en-US" b="1" dirty="0" smtClean="0"/>
+              <a:t> y </a:t>
+            </a:r>
+            <a:r>
+              <a:rPr lang="en-US" b="1" dirty="0" err="1" smtClean="0"/>
+              <a:t>operaciones</a:t>
+            </a:r>
+            <a:r>
+              <a:rPr lang="en-US" b="1" dirty="0" smtClean="0"/>
+              <a:t> </a:t>
+            </a:r>
+            <a:r>
+              <a:rPr lang="en-US" b="1" dirty="0" err="1" smtClean="0"/>
+              <a:t>para</a:t>
+            </a:r>
+            <a:r>
+              <a:rPr lang="en-US" b="1" dirty="0" smtClean="0"/>
+              <a:t> </a:t>
+            </a:r>
+            <a:r>
+              <a:rPr lang="en-US" b="1" dirty="0" err="1" smtClean="0"/>
+              <a:t>proceder</a:t>
+            </a:r>
+            <a:r>
+              <a:rPr lang="en-US" b="1" dirty="0" smtClean="0"/>
+              <a:t> a </a:t>
+            </a:r>
+            <a:r>
+              <a:rPr lang="en-US" b="1" dirty="0" err="1" smtClean="0"/>
+              <a:t>guardarlos</a:t>
+            </a:r>
+            <a:r>
+              <a:rPr lang="en-US" b="1" dirty="0" smtClean="0"/>
+              <a:t> en un </a:t>
+            </a:r>
+            <a:r>
+              <a:rPr lang="en-US" b="1" dirty="0" err="1" smtClean="0"/>
+              <a:t>archivo</a:t>
+            </a:r>
+            <a:r>
+              <a:rPr lang="en-US" b="1" dirty="0" smtClean="0"/>
+              <a:t> de </a:t>
+            </a:r>
+            <a:r>
+              <a:rPr lang="en-US" b="1" dirty="0" err="1" smtClean="0"/>
+              <a:t>texto</a:t>
+            </a:r>
+            <a:r>
+              <a:rPr lang="en-US" b="1" dirty="0" smtClean="0"/>
+              <a:t> </a:t>
+            </a:r>
+            <a:r>
+              <a:rPr lang="en-US" b="1" dirty="0" err="1" smtClean="0"/>
+              <a:t>para</a:t>
+            </a:r>
+            <a:r>
+              <a:rPr lang="en-US" b="1" dirty="0" smtClean="0"/>
+              <a:t> </a:t>
+            </a:r>
+            <a:r>
+              <a:rPr lang="en-US" b="1" dirty="0" err="1" smtClean="0"/>
+              <a:t>posteriormente</a:t>
+            </a:r>
+            <a:r>
+              <a:rPr lang="en-US" b="1" dirty="0" smtClean="0"/>
+              <a:t> </a:t>
+            </a:r>
+            <a:r>
+              <a:rPr lang="en-US" b="1" dirty="0" err="1" smtClean="0"/>
+              <a:t>si</a:t>
+            </a:r>
+            <a:r>
+              <a:rPr lang="en-US" b="1" dirty="0" smtClean="0"/>
+              <a:t> el </a:t>
+            </a:r>
+            <a:r>
+              <a:rPr lang="en-US" b="1" dirty="0" err="1" smtClean="0"/>
+              <a:t>usuario</a:t>
+            </a:r>
+            <a:r>
+              <a:rPr lang="en-US" b="1" dirty="0" smtClean="0"/>
+              <a:t> </a:t>
+            </a:r>
+            <a:r>
+              <a:rPr lang="en-US" b="1" dirty="0" err="1" smtClean="0"/>
+              <a:t>desea</a:t>
+            </a:r>
+            <a:r>
+              <a:rPr lang="en-US" b="1" dirty="0" smtClean="0"/>
+              <a:t> </a:t>
+            </a:r>
+            <a:r>
+              <a:rPr lang="en-US" b="1" dirty="0" err="1" smtClean="0"/>
+              <a:t>continuar</a:t>
+            </a:r>
+            <a:r>
+              <a:rPr lang="en-US" b="1" dirty="0" smtClean="0"/>
+              <a:t> la </a:t>
+            </a:r>
+            <a:r>
+              <a:rPr lang="en-US" b="1" dirty="0" err="1" smtClean="0"/>
+              <a:t>partida</a:t>
+            </a:r>
+            <a:r>
+              <a:rPr lang="en-US" b="1" dirty="0" smtClean="0"/>
+              <a:t> a </a:t>
+            </a:r>
+            <a:r>
+              <a:rPr lang="en-US" b="1" dirty="0" err="1" smtClean="0"/>
+              <a:t>partir</a:t>
+            </a:r>
+            <a:r>
+              <a:rPr lang="en-US" b="1" dirty="0" smtClean="0"/>
+              <a:t> de lo </a:t>
+            </a:r>
+            <a:r>
+              <a:rPr lang="en-US" b="1" dirty="0" err="1" smtClean="0"/>
+              <a:t>guardado</a:t>
+            </a:r>
+            <a:r>
+              <a:rPr lang="en-US" b="1" dirty="0" smtClean="0"/>
+              <a:t>.</a:t>
+            </a:r>
+            <a:endParaRPr lang="es-EC" b="1" dirty="0"/>
+          </a:p>
+        </p:txBody>
+      </p:sp>
     </p:spTree>
     <p:extLst>
       <p:ext uri="{BB962C8B-B14F-4D97-AF65-F5344CB8AC3E}">
-        <p14:creationId xmlns:p14="http://schemas.microsoft.com/office/powerpoint/2010/main" val="3097609471"/>
+        <p14:creationId xmlns:p14="http://schemas.microsoft.com/office/powerpoint/2010/main" xmlns="" val="3097609471"/>
       </p:ext>
     </p:extLst>
   </p:cSld>
@@ -9534,7 +9880,7 @@
     </a:clrScheme>
     <a:fontScheme name="Wisp">
       <a:majorFont>
-        <a:latin typeface="Century Gothic" panose="020B0502020202020204"/>
+        <a:latin typeface="Century Gothic"/>
         <a:ea typeface=""/>
         <a:cs typeface=""/>
         <a:font script="Jpan" typeface="メイリオ"/>
@@ -9569,7 +9915,7 @@
         <a:font script="Geor" typeface="Sylfaen"/>
       </a:majorFont>
       <a:minorFont>
-        <a:latin typeface="Century Gothic" panose="020B0502020202020204"/>
+        <a:latin typeface="Century Gothic"/>
         <a:ea typeface=""/>
         <a:cs typeface=""/>
         <a:font script="Jpan" typeface="メイリオ"/>
@@ -9728,7 +10074,7 @@
   <a:extraClrSchemeLst/>
   <a:extLst>
     <a:ext uri="{05A4C25C-085E-4340-85A3-A5531E510DB2}">
-      <thm15:themeFamily xmlns:thm15="http://schemas.microsoft.com/office/thememl/2012/main" name="Wisp" id="{7CB32D59-10C0-40DD-B7BD-2E94284A981C}" vid="{24B1A44C-C006-48B2-A4D7-E5549B3D8CD4}"/>
+      <thm15:themeFamily xmlns:thm15="http://schemas.microsoft.com/office/thememl/2012/main" xmlns="" name="Wisp" id="{7CB32D59-10C0-40DD-B7BD-2E94284A981C}" vid="{24B1A44C-C006-48B2-A4D7-E5549B3D8CD4}"/>
     </a:ext>
   </a:extLst>
 </a:theme>

</xml_diff>